<commit_message>
Modified slide 31 of python dictionaries presentation.
</commit_message>
<xml_diff>
--- a/python/presentations/learning_python/19_ceda-dict.pptx
+++ b/python/presentations/learning_python/19_ceda-dict.pptx
@@ -323,7 +323,7 @@
               <a:pPr>
                 <a:defRPr/>
               </a:pPr>
-              <a:t>09/10/2018</a:t>
+              <a:t>20/11/2018</a:t>
             </a:fld>
             <a:endParaRPr lang="en-GB"/>
           </a:p>
@@ -465,7 +465,7 @@
         <p:nvSpPr>
           <p:cNvPr id="8194" name="Rectangle 1"/>
           <p:cNvSpPr>
-            <a:spLocks noGrp="1" noChangeArrowheads="1"/>
+            <a:spLocks noGrp="1" noRot="1" noChangeAspect="1" noChangeArrowheads="1"/>
           </p:cNvSpPr>
           <p:nvPr>
             <p:ph type="sldImg"/>
@@ -1295,7 +1295,7 @@
         <p:nvSpPr>
           <p:cNvPr id="12291" name="Text Box 1"/>
           <p:cNvSpPr>
-            <a:spLocks noChangeArrowheads="1" noTextEdit="1"/>
+            <a:spLocks noGrp="1" noRot="1" noChangeAspect="1" noChangeArrowheads="1" noTextEdit="1"/>
           </p:cNvSpPr>
           <p:nvPr>
             <p:ph type="sldImg"/>
@@ -1323,7 +1323,7 @@
         <p:nvSpPr>
           <p:cNvPr id="12292" name="Text Box 2"/>
           <p:cNvSpPr>
-            <a:spLocks noChangeArrowheads="1"/>
+            <a:spLocks noGrp="1" noChangeArrowheads="1"/>
           </p:cNvSpPr>
           <p:nvPr>
             <p:ph type="body" idx="1"/>
@@ -1713,7 +1713,7 @@
         <p:nvSpPr>
           <p:cNvPr id="30723" name="Text Box 1"/>
           <p:cNvSpPr>
-            <a:spLocks noChangeArrowheads="1" noTextEdit="1"/>
+            <a:spLocks noGrp="1" noRot="1" noChangeAspect="1" noChangeArrowheads="1" noTextEdit="1"/>
           </p:cNvSpPr>
           <p:nvPr>
             <p:ph type="sldImg"/>
@@ -1741,7 +1741,7 @@
         <p:nvSpPr>
           <p:cNvPr id="30724" name="Text Box 2"/>
           <p:cNvSpPr>
-            <a:spLocks noChangeArrowheads="1"/>
+            <a:spLocks noGrp="1" noChangeArrowheads="1"/>
           </p:cNvSpPr>
           <p:nvPr>
             <p:ph type="body" idx="1"/>
@@ -2131,7 +2131,7 @@
         <p:nvSpPr>
           <p:cNvPr id="32771" name="Text Box 1"/>
           <p:cNvSpPr>
-            <a:spLocks noChangeArrowheads="1" noTextEdit="1"/>
+            <a:spLocks noGrp="1" noRot="1" noChangeAspect="1" noChangeArrowheads="1" noTextEdit="1"/>
           </p:cNvSpPr>
           <p:nvPr>
             <p:ph type="sldImg"/>
@@ -2159,7 +2159,7 @@
         <p:nvSpPr>
           <p:cNvPr id="32772" name="Text Box 2"/>
           <p:cNvSpPr>
-            <a:spLocks noChangeArrowheads="1"/>
+            <a:spLocks noGrp="1" noChangeArrowheads="1"/>
           </p:cNvSpPr>
           <p:nvPr>
             <p:ph type="body" idx="1"/>
@@ -2549,7 +2549,7 @@
         <p:nvSpPr>
           <p:cNvPr id="34819" name="Text Box 1"/>
           <p:cNvSpPr>
-            <a:spLocks noChangeArrowheads="1" noTextEdit="1"/>
+            <a:spLocks noGrp="1" noRot="1" noChangeAspect="1" noChangeArrowheads="1" noTextEdit="1"/>
           </p:cNvSpPr>
           <p:nvPr>
             <p:ph type="sldImg"/>
@@ -2577,7 +2577,7 @@
         <p:nvSpPr>
           <p:cNvPr id="34820" name="Text Box 2"/>
           <p:cNvSpPr>
-            <a:spLocks noChangeArrowheads="1"/>
+            <a:spLocks noGrp="1" noChangeArrowheads="1"/>
           </p:cNvSpPr>
           <p:nvPr>
             <p:ph type="body" idx="1"/>
@@ -2967,7 +2967,7 @@
         <p:nvSpPr>
           <p:cNvPr id="36867" name="Text Box 1"/>
           <p:cNvSpPr>
-            <a:spLocks noChangeArrowheads="1" noTextEdit="1"/>
+            <a:spLocks noGrp="1" noRot="1" noChangeAspect="1" noChangeArrowheads="1" noTextEdit="1"/>
           </p:cNvSpPr>
           <p:nvPr>
             <p:ph type="sldImg"/>
@@ -2995,7 +2995,7 @@
         <p:nvSpPr>
           <p:cNvPr id="36868" name="Text Box 2"/>
           <p:cNvSpPr>
-            <a:spLocks noChangeArrowheads="1"/>
+            <a:spLocks noGrp="1" noChangeArrowheads="1"/>
           </p:cNvSpPr>
           <p:nvPr>
             <p:ph type="body" idx="1"/>
@@ -3385,7 +3385,7 @@
         <p:nvSpPr>
           <p:cNvPr id="38915" name="Text Box 1"/>
           <p:cNvSpPr>
-            <a:spLocks noChangeArrowheads="1" noTextEdit="1"/>
+            <a:spLocks noGrp="1" noRot="1" noChangeAspect="1" noChangeArrowheads="1" noTextEdit="1"/>
           </p:cNvSpPr>
           <p:nvPr>
             <p:ph type="sldImg"/>
@@ -3413,7 +3413,7 @@
         <p:nvSpPr>
           <p:cNvPr id="38916" name="Text Box 2"/>
           <p:cNvSpPr>
-            <a:spLocks noChangeArrowheads="1"/>
+            <a:spLocks noGrp="1" noChangeArrowheads="1"/>
           </p:cNvSpPr>
           <p:nvPr>
             <p:ph type="body" idx="1"/>
@@ -3803,7 +3803,7 @@
         <p:nvSpPr>
           <p:cNvPr id="40963" name="Text Box 1"/>
           <p:cNvSpPr>
-            <a:spLocks noChangeArrowheads="1" noTextEdit="1"/>
+            <a:spLocks noGrp="1" noRot="1" noChangeAspect="1" noChangeArrowheads="1" noTextEdit="1"/>
           </p:cNvSpPr>
           <p:nvPr>
             <p:ph type="sldImg"/>
@@ -3831,7 +3831,7 @@
         <p:nvSpPr>
           <p:cNvPr id="40964" name="Text Box 2"/>
           <p:cNvSpPr>
-            <a:spLocks noChangeArrowheads="1"/>
+            <a:spLocks noGrp="1" noChangeArrowheads="1"/>
           </p:cNvSpPr>
           <p:nvPr>
             <p:ph type="body" idx="1"/>
@@ -4221,7 +4221,7 @@
         <p:nvSpPr>
           <p:cNvPr id="43011" name="Text Box 1"/>
           <p:cNvSpPr>
-            <a:spLocks noChangeArrowheads="1" noTextEdit="1"/>
+            <a:spLocks noGrp="1" noRot="1" noChangeAspect="1" noChangeArrowheads="1" noTextEdit="1"/>
           </p:cNvSpPr>
           <p:nvPr>
             <p:ph type="sldImg"/>
@@ -4249,7 +4249,7 @@
         <p:nvSpPr>
           <p:cNvPr id="43012" name="Text Box 2"/>
           <p:cNvSpPr>
-            <a:spLocks noChangeArrowheads="1"/>
+            <a:spLocks noGrp="1" noChangeArrowheads="1"/>
           </p:cNvSpPr>
           <p:nvPr>
             <p:ph type="body" idx="1"/>
@@ -4639,7 +4639,7 @@
         <p:nvSpPr>
           <p:cNvPr id="45059" name="Text Box 1"/>
           <p:cNvSpPr>
-            <a:spLocks noChangeArrowheads="1" noTextEdit="1"/>
+            <a:spLocks noGrp="1" noRot="1" noChangeAspect="1" noChangeArrowheads="1" noTextEdit="1"/>
           </p:cNvSpPr>
           <p:nvPr>
             <p:ph type="sldImg"/>
@@ -4667,7 +4667,7 @@
         <p:nvSpPr>
           <p:cNvPr id="45060" name="Text Box 2"/>
           <p:cNvSpPr>
-            <a:spLocks noChangeArrowheads="1"/>
+            <a:spLocks noGrp="1" noChangeArrowheads="1"/>
           </p:cNvSpPr>
           <p:nvPr>
             <p:ph type="body" idx="1"/>
@@ -5057,7 +5057,7 @@
         <p:nvSpPr>
           <p:cNvPr id="47107" name="Text Box 1"/>
           <p:cNvSpPr>
-            <a:spLocks noChangeArrowheads="1" noTextEdit="1"/>
+            <a:spLocks noGrp="1" noRot="1" noChangeAspect="1" noChangeArrowheads="1" noTextEdit="1"/>
           </p:cNvSpPr>
           <p:nvPr>
             <p:ph type="sldImg"/>
@@ -5085,7 +5085,7 @@
         <p:nvSpPr>
           <p:cNvPr id="47108" name="Text Box 2"/>
           <p:cNvSpPr>
-            <a:spLocks noChangeArrowheads="1"/>
+            <a:spLocks noGrp="1" noChangeArrowheads="1"/>
           </p:cNvSpPr>
           <p:nvPr>
             <p:ph type="body" idx="1"/>
@@ -5475,7 +5475,7 @@
         <p:nvSpPr>
           <p:cNvPr id="49155" name="Text Box 1"/>
           <p:cNvSpPr>
-            <a:spLocks noChangeArrowheads="1" noTextEdit="1"/>
+            <a:spLocks noGrp="1" noRot="1" noChangeAspect="1" noChangeArrowheads="1" noTextEdit="1"/>
           </p:cNvSpPr>
           <p:nvPr>
             <p:ph type="sldImg"/>
@@ -5503,7 +5503,7 @@
         <p:nvSpPr>
           <p:cNvPr id="49156" name="Text Box 2"/>
           <p:cNvSpPr>
-            <a:spLocks noChangeArrowheads="1"/>
+            <a:spLocks noGrp="1" noChangeArrowheads="1"/>
           </p:cNvSpPr>
           <p:nvPr>
             <p:ph type="body" idx="1"/>
@@ -5893,7 +5893,7 @@
         <p:nvSpPr>
           <p:cNvPr id="14339" name="Text Box 1"/>
           <p:cNvSpPr>
-            <a:spLocks noChangeArrowheads="1" noTextEdit="1"/>
+            <a:spLocks noGrp="1" noRot="1" noChangeAspect="1" noChangeArrowheads="1" noTextEdit="1"/>
           </p:cNvSpPr>
           <p:nvPr>
             <p:ph type="sldImg"/>
@@ -5921,7 +5921,7 @@
         <p:nvSpPr>
           <p:cNvPr id="14340" name="Text Box 2"/>
           <p:cNvSpPr>
-            <a:spLocks noChangeArrowheads="1"/>
+            <a:spLocks noGrp="1" noChangeArrowheads="1"/>
           </p:cNvSpPr>
           <p:nvPr>
             <p:ph type="body" idx="1"/>
@@ -6311,7 +6311,7 @@
         <p:nvSpPr>
           <p:cNvPr id="51203" name="Text Box 1"/>
           <p:cNvSpPr>
-            <a:spLocks noChangeArrowheads="1" noTextEdit="1"/>
+            <a:spLocks noGrp="1" noRot="1" noChangeAspect="1" noChangeArrowheads="1" noTextEdit="1"/>
           </p:cNvSpPr>
           <p:nvPr>
             <p:ph type="sldImg"/>
@@ -6339,7 +6339,7 @@
         <p:nvSpPr>
           <p:cNvPr id="51204" name="Text Box 2"/>
           <p:cNvSpPr>
-            <a:spLocks noChangeArrowheads="1"/>
+            <a:spLocks noGrp="1" noChangeArrowheads="1"/>
           </p:cNvSpPr>
           <p:nvPr>
             <p:ph type="body" idx="1"/>
@@ -6729,7 +6729,7 @@
         <p:nvSpPr>
           <p:cNvPr id="53251" name="Text Box 1"/>
           <p:cNvSpPr>
-            <a:spLocks noChangeArrowheads="1" noTextEdit="1"/>
+            <a:spLocks noGrp="1" noRot="1" noChangeAspect="1" noChangeArrowheads="1" noTextEdit="1"/>
           </p:cNvSpPr>
           <p:nvPr>
             <p:ph type="sldImg"/>
@@ -6757,7 +6757,7 @@
         <p:nvSpPr>
           <p:cNvPr id="53252" name="Text Box 2"/>
           <p:cNvSpPr>
-            <a:spLocks noChangeArrowheads="1"/>
+            <a:spLocks noGrp="1" noChangeArrowheads="1"/>
           </p:cNvSpPr>
           <p:nvPr>
             <p:ph type="body" idx="1"/>
@@ -7147,7 +7147,7 @@
         <p:nvSpPr>
           <p:cNvPr id="55299" name="Text Box 1"/>
           <p:cNvSpPr>
-            <a:spLocks noChangeArrowheads="1" noTextEdit="1"/>
+            <a:spLocks noGrp="1" noRot="1" noChangeAspect="1" noChangeArrowheads="1" noTextEdit="1"/>
           </p:cNvSpPr>
           <p:nvPr>
             <p:ph type="sldImg"/>
@@ -7175,7 +7175,7 @@
         <p:nvSpPr>
           <p:cNvPr id="55300" name="Text Box 2"/>
           <p:cNvSpPr>
-            <a:spLocks noChangeArrowheads="1"/>
+            <a:spLocks noGrp="1" noChangeArrowheads="1"/>
           </p:cNvSpPr>
           <p:nvPr>
             <p:ph type="body" idx="1"/>
@@ -7565,7 +7565,7 @@
         <p:nvSpPr>
           <p:cNvPr id="57347" name="Text Box 1"/>
           <p:cNvSpPr>
-            <a:spLocks noChangeArrowheads="1" noTextEdit="1"/>
+            <a:spLocks noGrp="1" noRot="1" noChangeAspect="1" noChangeArrowheads="1" noTextEdit="1"/>
           </p:cNvSpPr>
           <p:nvPr>
             <p:ph type="sldImg"/>
@@ -7593,7 +7593,7 @@
         <p:nvSpPr>
           <p:cNvPr id="57348" name="Text Box 2"/>
           <p:cNvSpPr>
-            <a:spLocks noChangeArrowheads="1"/>
+            <a:spLocks noGrp="1" noChangeArrowheads="1"/>
           </p:cNvSpPr>
           <p:nvPr>
             <p:ph type="body" idx="1"/>
@@ -7983,7 +7983,7 @@
         <p:nvSpPr>
           <p:cNvPr id="59395" name="Text Box 1"/>
           <p:cNvSpPr>
-            <a:spLocks noChangeArrowheads="1" noTextEdit="1"/>
+            <a:spLocks noGrp="1" noRot="1" noChangeAspect="1" noChangeArrowheads="1" noTextEdit="1"/>
           </p:cNvSpPr>
           <p:nvPr>
             <p:ph type="sldImg"/>
@@ -8011,7 +8011,7 @@
         <p:nvSpPr>
           <p:cNvPr id="59396" name="Text Box 2"/>
           <p:cNvSpPr>
-            <a:spLocks noChangeArrowheads="1"/>
+            <a:spLocks noGrp="1" noChangeArrowheads="1"/>
           </p:cNvSpPr>
           <p:nvPr>
             <p:ph type="body" idx="1"/>
@@ -8401,7 +8401,7 @@
         <p:nvSpPr>
           <p:cNvPr id="61443" name="Text Box 1"/>
           <p:cNvSpPr>
-            <a:spLocks noChangeArrowheads="1" noTextEdit="1"/>
+            <a:spLocks noGrp="1" noRot="1" noChangeAspect="1" noChangeArrowheads="1" noTextEdit="1"/>
           </p:cNvSpPr>
           <p:nvPr>
             <p:ph type="sldImg"/>
@@ -8429,7 +8429,7 @@
         <p:nvSpPr>
           <p:cNvPr id="61444" name="Text Box 2"/>
           <p:cNvSpPr>
-            <a:spLocks noChangeArrowheads="1"/>
+            <a:spLocks noGrp="1" noChangeArrowheads="1"/>
           </p:cNvSpPr>
           <p:nvPr>
             <p:ph type="body" idx="1"/>
@@ -8819,7 +8819,7 @@
         <p:nvSpPr>
           <p:cNvPr id="63491" name="Text Box 1"/>
           <p:cNvSpPr>
-            <a:spLocks noChangeArrowheads="1" noTextEdit="1"/>
+            <a:spLocks noGrp="1" noRot="1" noChangeAspect="1" noChangeArrowheads="1" noTextEdit="1"/>
           </p:cNvSpPr>
           <p:nvPr>
             <p:ph type="sldImg"/>
@@ -8847,7 +8847,7 @@
         <p:nvSpPr>
           <p:cNvPr id="63492" name="Text Box 2"/>
           <p:cNvSpPr>
-            <a:spLocks noChangeArrowheads="1"/>
+            <a:spLocks noGrp="1" noChangeArrowheads="1"/>
           </p:cNvSpPr>
           <p:nvPr>
             <p:ph type="body" idx="1"/>
@@ -9237,7 +9237,7 @@
         <p:nvSpPr>
           <p:cNvPr id="65539" name="Text Box 1"/>
           <p:cNvSpPr>
-            <a:spLocks noChangeArrowheads="1" noTextEdit="1"/>
+            <a:spLocks noGrp="1" noRot="1" noChangeAspect="1" noChangeArrowheads="1" noTextEdit="1"/>
           </p:cNvSpPr>
           <p:nvPr>
             <p:ph type="sldImg"/>
@@ -9265,7 +9265,7 @@
         <p:nvSpPr>
           <p:cNvPr id="65540" name="Text Box 2"/>
           <p:cNvSpPr>
-            <a:spLocks noChangeArrowheads="1"/>
+            <a:spLocks noGrp="1" noChangeArrowheads="1"/>
           </p:cNvSpPr>
           <p:nvPr>
             <p:ph type="body" idx="1"/>
@@ -9655,7 +9655,7 @@
         <p:nvSpPr>
           <p:cNvPr id="67587" name="Text Box 1"/>
           <p:cNvSpPr>
-            <a:spLocks noChangeArrowheads="1" noTextEdit="1"/>
+            <a:spLocks noGrp="1" noRot="1" noChangeAspect="1" noChangeArrowheads="1" noTextEdit="1"/>
           </p:cNvSpPr>
           <p:nvPr>
             <p:ph type="sldImg"/>
@@ -9683,7 +9683,7 @@
         <p:nvSpPr>
           <p:cNvPr id="67588" name="Text Box 2"/>
           <p:cNvSpPr>
-            <a:spLocks noChangeArrowheads="1"/>
+            <a:spLocks noGrp="1" noChangeArrowheads="1"/>
           </p:cNvSpPr>
           <p:nvPr>
             <p:ph type="body" idx="1"/>
@@ -10073,7 +10073,7 @@
         <p:nvSpPr>
           <p:cNvPr id="69635" name="Text Box 1"/>
           <p:cNvSpPr>
-            <a:spLocks noChangeArrowheads="1" noTextEdit="1"/>
+            <a:spLocks noGrp="1" noRot="1" noChangeAspect="1" noChangeArrowheads="1" noTextEdit="1"/>
           </p:cNvSpPr>
           <p:nvPr>
             <p:ph type="sldImg"/>
@@ -10101,7 +10101,7 @@
         <p:nvSpPr>
           <p:cNvPr id="69636" name="Text Box 2"/>
           <p:cNvSpPr>
-            <a:spLocks noChangeArrowheads="1"/>
+            <a:spLocks noGrp="1" noChangeArrowheads="1"/>
           </p:cNvSpPr>
           <p:nvPr>
             <p:ph type="body" idx="1"/>
@@ -10491,7 +10491,7 @@
         <p:nvSpPr>
           <p:cNvPr id="16387" name="Text Box 1"/>
           <p:cNvSpPr>
-            <a:spLocks noChangeArrowheads="1" noTextEdit="1"/>
+            <a:spLocks noGrp="1" noRot="1" noChangeAspect="1" noChangeArrowheads="1" noTextEdit="1"/>
           </p:cNvSpPr>
           <p:nvPr>
             <p:ph type="sldImg"/>
@@ -10519,7 +10519,7 @@
         <p:nvSpPr>
           <p:cNvPr id="16388" name="Text Box 2"/>
           <p:cNvSpPr>
-            <a:spLocks noChangeArrowheads="1"/>
+            <a:spLocks noGrp="1" noChangeArrowheads="1"/>
           </p:cNvSpPr>
           <p:nvPr>
             <p:ph type="body" idx="1"/>
@@ -10909,7 +10909,7 @@
         <p:nvSpPr>
           <p:cNvPr id="71683" name="Text Box 1"/>
           <p:cNvSpPr>
-            <a:spLocks noChangeArrowheads="1" noTextEdit="1"/>
+            <a:spLocks noGrp="1" noRot="1" noChangeAspect="1" noChangeArrowheads="1" noTextEdit="1"/>
           </p:cNvSpPr>
           <p:nvPr>
             <p:ph type="sldImg"/>
@@ -10937,7 +10937,7 @@
         <p:nvSpPr>
           <p:cNvPr id="71684" name="Text Box 2"/>
           <p:cNvSpPr>
-            <a:spLocks noChangeArrowheads="1"/>
+            <a:spLocks noGrp="1" noChangeArrowheads="1"/>
           </p:cNvSpPr>
           <p:nvPr>
             <p:ph type="body" idx="1"/>
@@ -11327,7 +11327,7 @@
         <p:nvSpPr>
           <p:cNvPr id="18435" name="Text Box 1"/>
           <p:cNvSpPr>
-            <a:spLocks noChangeArrowheads="1" noTextEdit="1"/>
+            <a:spLocks noGrp="1" noRot="1" noChangeAspect="1" noChangeArrowheads="1" noTextEdit="1"/>
           </p:cNvSpPr>
           <p:nvPr>
             <p:ph type="sldImg"/>
@@ -11355,7 +11355,7 @@
         <p:nvSpPr>
           <p:cNvPr id="18436" name="Text Box 2"/>
           <p:cNvSpPr>
-            <a:spLocks noChangeArrowheads="1"/>
+            <a:spLocks noGrp="1" noChangeArrowheads="1"/>
           </p:cNvSpPr>
           <p:nvPr>
             <p:ph type="body" idx="1"/>
@@ -11745,7 +11745,7 @@
         <p:nvSpPr>
           <p:cNvPr id="20483" name="Text Box 1"/>
           <p:cNvSpPr>
-            <a:spLocks noChangeArrowheads="1" noTextEdit="1"/>
+            <a:spLocks noGrp="1" noRot="1" noChangeAspect="1" noChangeArrowheads="1" noTextEdit="1"/>
           </p:cNvSpPr>
           <p:nvPr>
             <p:ph type="sldImg"/>
@@ -11773,7 +11773,7 @@
         <p:nvSpPr>
           <p:cNvPr id="20484" name="Text Box 2"/>
           <p:cNvSpPr>
-            <a:spLocks noChangeArrowheads="1"/>
+            <a:spLocks noGrp="1" noChangeArrowheads="1"/>
           </p:cNvSpPr>
           <p:nvPr>
             <p:ph type="body" idx="1"/>
@@ -12163,7 +12163,7 @@
         <p:nvSpPr>
           <p:cNvPr id="22531" name="Text Box 1"/>
           <p:cNvSpPr>
-            <a:spLocks noChangeArrowheads="1" noTextEdit="1"/>
+            <a:spLocks noGrp="1" noRot="1" noChangeAspect="1" noChangeArrowheads="1" noTextEdit="1"/>
           </p:cNvSpPr>
           <p:nvPr>
             <p:ph type="sldImg"/>
@@ -12191,7 +12191,7 @@
         <p:nvSpPr>
           <p:cNvPr id="22532" name="Text Box 2"/>
           <p:cNvSpPr>
-            <a:spLocks noChangeArrowheads="1"/>
+            <a:spLocks noGrp="1" noChangeArrowheads="1"/>
           </p:cNvSpPr>
           <p:nvPr>
             <p:ph type="body" idx="1"/>
@@ -12581,7 +12581,7 @@
         <p:nvSpPr>
           <p:cNvPr id="24579" name="Text Box 1"/>
           <p:cNvSpPr>
-            <a:spLocks noChangeArrowheads="1" noTextEdit="1"/>
+            <a:spLocks noGrp="1" noRot="1" noChangeAspect="1" noChangeArrowheads="1" noTextEdit="1"/>
           </p:cNvSpPr>
           <p:nvPr>
             <p:ph type="sldImg"/>
@@ -12609,7 +12609,7 @@
         <p:nvSpPr>
           <p:cNvPr id="24580" name="Text Box 2"/>
           <p:cNvSpPr>
-            <a:spLocks noChangeArrowheads="1"/>
+            <a:spLocks noGrp="1" noChangeArrowheads="1"/>
           </p:cNvSpPr>
           <p:nvPr>
             <p:ph type="body" idx="1"/>
@@ -12999,7 +12999,7 @@
         <p:nvSpPr>
           <p:cNvPr id="26627" name="Text Box 1"/>
           <p:cNvSpPr>
-            <a:spLocks noChangeArrowheads="1" noTextEdit="1"/>
+            <a:spLocks noGrp="1" noRot="1" noChangeAspect="1" noChangeArrowheads="1" noTextEdit="1"/>
           </p:cNvSpPr>
           <p:nvPr>
             <p:ph type="sldImg"/>
@@ -13027,7 +13027,7 @@
         <p:nvSpPr>
           <p:cNvPr id="26628" name="Text Box 2"/>
           <p:cNvSpPr>
-            <a:spLocks noChangeArrowheads="1"/>
+            <a:spLocks noGrp="1" noChangeArrowheads="1"/>
           </p:cNvSpPr>
           <p:nvPr>
             <p:ph type="body" idx="1"/>
@@ -13417,7 +13417,7 @@
         <p:nvSpPr>
           <p:cNvPr id="28675" name="Text Box 1"/>
           <p:cNvSpPr>
-            <a:spLocks noChangeArrowheads="1" noTextEdit="1"/>
+            <a:spLocks noGrp="1" noRot="1" noChangeAspect="1" noChangeArrowheads="1" noTextEdit="1"/>
           </p:cNvSpPr>
           <p:nvPr>
             <p:ph type="sldImg"/>
@@ -13445,7 +13445,7 @@
         <p:nvSpPr>
           <p:cNvPr id="28676" name="Text Box 2"/>
           <p:cNvSpPr>
-            <a:spLocks noChangeArrowheads="1"/>
+            <a:spLocks noGrp="1" noChangeArrowheads="1"/>
           </p:cNvSpPr>
           <p:nvPr>
             <p:ph type="body" idx="1"/>
@@ -14037,7 +14037,7 @@
               <a:pPr>
                 <a:defRPr/>
               </a:pPr>
-              <a:t>09/10/2018</a:t>
+              <a:t>20/11/2018</a:t>
             </a:fld>
             <a:endParaRPr lang="en-GB" dirty="0"/>
           </a:p>
@@ -14272,7 +14272,7 @@
               <a:pPr>
                 <a:defRPr/>
               </a:pPr>
-              <a:t>09/10/2018</a:t>
+              <a:t>20/11/2018</a:t>
             </a:fld>
             <a:endParaRPr lang="en-GB" dirty="0"/>
           </a:p>
@@ -16339,7 +16339,7 @@
   <p:timing>
     <p:tnLst>
       <p:par>
-        <p:cTn id="1" dur="indefinite" nodeType="tmRoot">
+        <p:cTn id="1" dur="indefinite" restart="never" nodeType="tmRoot">
           <p:childTnLst>
             <p:seq concurrent="1" nextAc="seek">
               <p:cTn id="2" dur="0" nodeType="mainSeq"/>
@@ -17038,7 +17038,7 @@
   <p:timing>
     <p:tnLst>
       <p:par>
-        <p:cTn id="1" dur="indefinite" nodeType="tmRoot">
+        <p:cTn id="1" dur="indefinite" restart="never" nodeType="tmRoot">
           <p:childTnLst>
             <p:seq concurrent="1" nextAc="seek">
               <p:cTn id="2" dur="0" nodeType="mainSeq"/>
@@ -17759,7 +17759,7 @@
   <p:timing>
     <p:tnLst>
       <p:par>
-        <p:cTn id="1" dur="indefinite" nodeType="tmRoot">
+        <p:cTn id="1" dur="indefinite" restart="never" nodeType="tmRoot">
           <p:childTnLst>
             <p:seq concurrent="1" nextAc="seek">
               <p:cTn id="2" dur="0" nodeType="mainSeq"/>
@@ -18810,7 +18810,7 @@
   <p:timing>
     <p:tnLst>
       <p:par>
-        <p:cTn id="1" dur="indefinite" nodeType="tmRoot">
+        <p:cTn id="1" dur="indefinite" restart="never" nodeType="tmRoot">
           <p:childTnLst>
             <p:seq concurrent="1" nextAc="seek">
               <p:cTn id="2" dur="0" nodeType="mainSeq"/>
@@ -20045,7 +20045,7 @@
   <p:timing>
     <p:tnLst>
       <p:par>
-        <p:cTn id="1" dur="indefinite" nodeType="tmRoot">
+        <p:cTn id="1" dur="indefinite" restart="never" nodeType="tmRoot">
           <p:childTnLst>
             <p:seq concurrent="1" nextAc="seek">
               <p:cTn id="2" dur="0" nodeType="mainSeq"/>
@@ -20270,7 +20270,7 @@
   <p:timing>
     <p:tnLst>
       <p:par>
-        <p:cTn id="1" dur="indefinite" nodeType="tmRoot">
+        <p:cTn id="1" dur="indefinite" restart="never" nodeType="tmRoot">
           <p:childTnLst>
             <p:seq concurrent="1" nextAc="seek">
               <p:cTn id="2" dur="0" nodeType="mainSeq"/>
@@ -20800,7 +20800,7 @@
   <p:timing>
     <p:tnLst>
       <p:par>
-        <p:cTn id="1" dur="indefinite" nodeType="tmRoot">
+        <p:cTn id="1" dur="indefinite" restart="never" nodeType="tmRoot">
           <p:childTnLst>
             <p:seq concurrent="1" nextAc="seek">
               <p:cTn id="2" dur="0" nodeType="mainSeq"/>
@@ -21499,7 +21499,7 @@
   <p:timing>
     <p:tnLst>
       <p:par>
-        <p:cTn id="1" dur="indefinite" nodeType="tmRoot">
+        <p:cTn id="1" dur="indefinite" restart="never" nodeType="tmRoot">
           <p:childTnLst>
             <p:seq concurrent="1" nextAc="seek">
               <p:cTn id="2" dur="0" nodeType="mainSeq"/>
@@ -22541,7 +22541,7 @@
   <p:timing>
     <p:tnLst>
       <p:par>
-        <p:cTn id="1" dur="indefinite" nodeType="tmRoot">
+        <p:cTn id="1" dur="indefinite" restart="never" nodeType="tmRoot">
           <p:childTnLst>
             <p:seq concurrent="1" nextAc="seek">
               <p:cTn id="2" dur="0" nodeType="mainSeq"/>
@@ -22778,7 +22778,7 @@
   <p:timing>
     <p:tnLst>
       <p:par>
-        <p:cTn id="1" dur="indefinite" nodeType="tmRoot">
+        <p:cTn id="1" dur="indefinite" restart="never" nodeType="tmRoot">
           <p:childTnLst>
             <p:seq concurrent="1" nextAc="seek">
               <p:cTn id="2" dur="0" nodeType="mainSeq"/>
@@ -23028,7 +23028,7 @@
   <p:timing>
     <p:tnLst>
       <p:par>
-        <p:cTn id="1" dur="indefinite" nodeType="tmRoot">
+        <p:cTn id="1" dur="indefinite" restart="never" nodeType="tmRoot">
           <p:childTnLst>
             <p:seq concurrent="1" nextAc="seek">
               <p:cTn id="2" dur="0" nodeType="mainSeq"/>
@@ -25581,7 +25581,7 @@
   <p:timing>
     <p:tnLst>
       <p:par>
-        <p:cTn id="1" dur="indefinite" nodeType="tmRoot">
+        <p:cTn id="1" dur="indefinite" restart="never" nodeType="tmRoot">
           <p:childTnLst>
             <p:seq concurrent="1" nextAc="seek">
               <p:cTn id="2" dur="0" nodeType="mainSeq"/>
@@ -25822,7 +25822,7 @@
   <p:timing>
     <p:tnLst>
       <p:par>
-        <p:cTn id="1" dur="indefinite" nodeType="tmRoot">
+        <p:cTn id="1" dur="indefinite" restart="never" nodeType="tmRoot">
           <p:childTnLst>
             <p:seq concurrent="1" nextAc="seek">
               <p:cTn id="2" dur="0" nodeType="mainSeq"/>
@@ -26396,7 +26396,7 @@
   <p:timing>
     <p:tnLst>
       <p:par>
-        <p:cTn id="1" dur="indefinite" nodeType="tmRoot">
+        <p:cTn id="1" dur="indefinite" restart="never" nodeType="tmRoot">
           <p:childTnLst>
             <p:seq concurrent="1" nextAc="seek">
               <p:cTn id="2" dur="0" nodeType="mainSeq"/>
@@ -27151,7 +27151,7 @@
   <p:timing>
     <p:tnLst>
       <p:par>
-        <p:cTn id="1" dur="indefinite" nodeType="tmRoot">
+        <p:cTn id="1" dur="indefinite" restart="never" nodeType="tmRoot">
           <p:childTnLst>
             <p:seq concurrent="1" nextAc="seek">
               <p:cTn id="2" dur="0" nodeType="mainSeq"/>
@@ -28301,7 +28301,7 @@
   <p:timing>
     <p:tnLst>
       <p:par>
-        <p:cTn id="1" dur="indefinite" nodeType="tmRoot">
+        <p:cTn id="1" dur="indefinite" restart="never" nodeType="tmRoot">
           <p:childTnLst>
             <p:seq concurrent="1" nextAc="seek">
               <p:cTn id="2" dur="0" nodeType="mainSeq"/>
@@ -28538,7 +28538,7 @@
   <p:timing>
     <p:tnLst>
       <p:par>
-        <p:cTn id="1" dur="indefinite" nodeType="tmRoot">
+        <p:cTn id="1" dur="indefinite" restart="never" nodeType="tmRoot">
           <p:childTnLst>
             <p:seq concurrent="1" nextAc="seek">
               <p:cTn id="2" dur="0" nodeType="mainSeq"/>
@@ -28834,7 +28834,7 @@
   <p:timing>
     <p:tnLst>
       <p:par>
-        <p:cTn id="1" dur="indefinite" nodeType="tmRoot">
+        <p:cTn id="1" dur="indefinite" restart="never" nodeType="tmRoot">
           <p:childTnLst>
             <p:seq concurrent="1" nextAc="seek">
               <p:cTn id="2" dur="0" nodeType="mainSeq"/>
@@ -29563,7 +29563,7 @@
   <p:timing>
     <p:tnLst>
       <p:par>
-        <p:cTn id="1" dur="indefinite" nodeType="tmRoot">
+        <p:cTn id="1" dur="indefinite" restart="never" nodeType="tmRoot">
           <p:childTnLst>
             <p:seq concurrent="1" nextAc="seek">
               <p:cTn id="2" dur="0" nodeType="mainSeq"/>
@@ -29918,7 +29918,7 @@
   <p:timing>
     <p:tnLst>
       <p:par>
-        <p:cTn id="1" dur="indefinite" nodeType="tmRoot">
+        <p:cTn id="1" dur="indefinite" restart="never" nodeType="tmRoot">
           <p:childTnLst>
             <p:seq concurrent="1" nextAc="seek">
               <p:cTn id="2" dur="0" nodeType="mainSeq"/>
@@ -30606,7 +30606,7 @@
   <p:timing>
     <p:tnLst>
       <p:par>
-        <p:cTn id="1" dur="indefinite" nodeType="tmRoot">
+        <p:cTn id="1" dur="indefinite" restart="never" nodeType="tmRoot">
           <p:childTnLst>
             <p:seq concurrent="1" nextAc="seek">
               <p:cTn id="2" dur="0" nodeType="mainSeq"/>
@@ -30890,7 +30890,7 @@
   <p:timing>
     <p:tnLst>
       <p:par>
-        <p:cTn id="1" dur="indefinite" nodeType="tmRoot">
+        <p:cTn id="1" dur="indefinite" restart="never" nodeType="tmRoot">
           <p:childTnLst>
             <p:seq concurrent="1" nextAc="seek">
               <p:cTn id="2" dur="0" nodeType="mainSeq"/>
@@ -31716,7 +31716,7 @@
   <p:timing>
     <p:tnLst>
       <p:par>
-        <p:cTn id="1" dur="indefinite" nodeType="tmRoot">
+        <p:cTn id="1" dur="indefinite" restart="never" nodeType="tmRoot">
           <p:childTnLst>
             <p:seq concurrent="1" nextAc="seek">
               <p:cTn id="2" dur="0" nodeType="mainSeq"/>
@@ -32286,7 +32286,7 @@
         <p:spPr bwMode="auto">
           <a:xfrm>
             <a:off x="546100" y="381000"/>
-            <a:ext cx="8378825" cy="2032000"/>
+            <a:ext cx="8594019" cy="2031325"/>
           </a:xfrm>
           <a:prstGeom prst="rect">
             <a:avLst/>
@@ -32543,7 +32543,25 @@
               <a:rPr lang="en-US" altLang="en-US" sz="2800" dirty="0" smtClean="0">
                 <a:latin typeface="Calibri" panose="020F0502020204030204" pitchFamily="34" charset="0"/>
               </a:rPr>
-              <a:t>returns a list of tuples: </a:t>
+              <a:t>returns a </a:t>
+            </a:r>
+            <a:r>
+              <a:rPr lang="en-US" altLang="en-US" sz="2800" dirty="0" smtClean="0">
+                <a:latin typeface="Calibri" panose="020F0502020204030204" pitchFamily="34" charset="0"/>
+              </a:rPr>
+              <a:t>sequence</a:t>
+            </a:r>
+            <a:r>
+              <a:rPr lang="en-US" altLang="en-US" sz="2800" dirty="0" smtClean="0">
+                <a:latin typeface="Calibri" panose="020F0502020204030204" pitchFamily="34" charset="0"/>
+              </a:rPr>
+              <a:t> </a:t>
+            </a:r>
+            <a:r>
+              <a:rPr lang="en-US" altLang="en-US" sz="2800" dirty="0" smtClean="0">
+                <a:latin typeface="Calibri" panose="020F0502020204030204" pitchFamily="34" charset="0"/>
+              </a:rPr>
+              <a:t>of tuples: </a:t>
             </a:r>
           </a:p>
           <a:p>
@@ -32564,8 +32582,33 @@
                 <a:latin typeface="Courier New" panose="02070309020205020404" pitchFamily="49" charset="0"/>
                 <a:cs typeface="Courier New" panose="02070309020205020404" pitchFamily="49" charset="0"/>
               </a:rPr>
-              <a:t>[(&lt;key&gt;, &lt;value&gt;), (&lt;key&gt;, &lt;value&gt;)]</a:t>
+              <a:t>(&lt;</a:t>
             </a:r>
+            <a:r>
+              <a:rPr lang="en-US" altLang="en-US" sz="2800" dirty="0" smtClean="0">
+                <a:latin typeface="Courier New" panose="02070309020205020404" pitchFamily="49" charset="0"/>
+                <a:cs typeface="Courier New" panose="02070309020205020404" pitchFamily="49" charset="0"/>
+              </a:rPr>
+              <a:t>key&gt;, &lt;value&gt;), (&lt;key&gt;, &lt;</a:t>
+            </a:r>
+            <a:r>
+              <a:rPr lang="en-US" altLang="en-US" sz="2800" smtClean="0">
+                <a:latin typeface="Courier New" panose="02070309020205020404" pitchFamily="49" charset="0"/>
+                <a:cs typeface="Courier New" panose="02070309020205020404" pitchFamily="49" charset="0"/>
+              </a:rPr>
+              <a:t>value</a:t>
+            </a:r>
+            <a:r>
+              <a:rPr lang="en-US" altLang="en-US" sz="2800" smtClean="0">
+                <a:latin typeface="Courier New" panose="02070309020205020404" pitchFamily="49" charset="0"/>
+                <a:cs typeface="Courier New" panose="02070309020205020404" pitchFamily="49" charset="0"/>
+              </a:rPr>
+              <a:t>&gt;), …</a:t>
+            </a:r>
+            <a:endParaRPr lang="en-US" altLang="en-US" sz="2800" dirty="0" smtClean="0">
+              <a:latin typeface="Courier New" panose="02070309020205020404" pitchFamily="49" charset="0"/>
+              <a:cs typeface="Courier New" panose="02070309020205020404" pitchFamily="49" charset="0"/>
+            </a:endParaRPr>
           </a:p>
         </p:txBody>
       </p:sp>
@@ -32578,7 +32621,7 @@
   <p:timing>
     <p:tnLst>
       <p:par>
-        <p:cTn id="1" dur="indefinite" nodeType="tmRoot">
+        <p:cTn id="1" dur="indefinite" restart="never" nodeType="tmRoot">
           <p:childTnLst>
             <p:seq concurrent="1" nextAc="seek">
               <p:cTn id="2" dur="0" nodeType="mainSeq"/>
@@ -32884,7 +32927,7 @@
   <p:timing>
     <p:tnLst>
       <p:par>
-        <p:cTn id="1" dur="indefinite" nodeType="tmRoot">
+        <p:cTn id="1" dur="indefinite" restart="never" nodeType="tmRoot">
           <p:childTnLst>
             <p:seq concurrent="1" nextAc="seek">
               <p:cTn id="2" dur="0" nodeType="mainSeq"/>
@@ -33212,7 +33255,7 @@
   <p:timing>
     <p:tnLst>
       <p:par>
-        <p:cTn id="1" dur="indefinite" nodeType="tmRoot">
+        <p:cTn id="1" dur="indefinite" restart="never" nodeType="tmRoot">
           <p:childTnLst>
             <p:seq concurrent="1" nextAc="seek">
               <p:cTn id="2" dur="0" nodeType="mainSeq"/>
@@ -33629,7 +33672,7 @@
   <p:timing>
     <p:tnLst>
       <p:par>
-        <p:cTn id="1" dur="indefinite" nodeType="tmRoot">
+        <p:cTn id="1" dur="indefinite" restart="never" nodeType="tmRoot">
           <p:childTnLst>
             <p:seq concurrent="1" nextAc="seek">
               <p:cTn id="2" dur="0" nodeType="mainSeq"/>
@@ -34001,7 +34044,7 @@
   <p:timing>
     <p:tnLst>
       <p:par>
-        <p:cTn id="1" dur="indefinite" nodeType="tmRoot">
+        <p:cTn id="1" dur="indefinite" restart="never" nodeType="tmRoot">
           <p:childTnLst>
             <p:seq concurrent="1" nextAc="seek">
               <p:cTn id="2" dur="0" nodeType="mainSeq"/>
@@ -34413,7 +34456,7 @@
   <p:timing>
     <p:tnLst>
       <p:par>
-        <p:cTn id="1" dur="indefinite" nodeType="tmRoot">
+        <p:cTn id="1" dur="indefinite" restart="never" nodeType="tmRoot">
           <p:childTnLst>
             <p:seq concurrent="1" nextAc="seek">
               <p:cTn id="2" dur="0" nodeType="mainSeq"/>
@@ -34645,7 +34688,7 @@
   <p:timing>
     <p:tnLst>
       <p:par>
-        <p:cTn id="1" dur="indefinite" nodeType="tmRoot">
+        <p:cTn id="1" dur="indefinite" restart="never" nodeType="tmRoot">
           <p:childTnLst>
             <p:seq concurrent="1" nextAc="seek">
               <p:cTn id="2" dur="0" nodeType="mainSeq"/>

</xml_diff>